<commit_message>
Slide about type hinting
</commit_message>
<xml_diff>
--- a/docs/Welcome to SHARC.pptx
+++ b/docs/Welcome to SHARC.pptx
@@ -10,10 +10,11 @@
     <p:sldId id="258" r:id="rId4"/>
     <p:sldId id="257" r:id="rId5"/>
     <p:sldId id="264" r:id="rId6"/>
-    <p:sldId id="260" r:id="rId7"/>
-    <p:sldId id="261" r:id="rId8"/>
-    <p:sldId id="262" r:id="rId9"/>
-    <p:sldId id="263" r:id="rId10"/>
+    <p:sldId id="265" r:id="rId7"/>
+    <p:sldId id="260" r:id="rId8"/>
+    <p:sldId id="261" r:id="rId9"/>
+    <p:sldId id="262" r:id="rId10"/>
+    <p:sldId id="263" r:id="rId11"/>
   </p:sldIdLst>
   <p:sldSz cx="9144000" cy="6858000" type="screen4x3"/>
   <p:notesSz cx="6858000" cy="9144000"/>
@@ -303,7 +304,7 @@
           <a:p>
             <a:fld id="{2E700DB3-DBF0-4086-B675-117E7A9610B8}" type="datetimeFigureOut">
               <a:rPr lang="pt-BR" smtClean="0"/>
-              <a:t>06/02/2017</a:t>
+              <a:t>13/02/2017</a:t>
             </a:fld>
             <a:endParaRPr lang="pt-BR"/>
           </a:p>
@@ -503,7 +504,7 @@
           <a:p>
             <a:fld id="{2E700DB3-DBF0-4086-B675-117E7A9610B8}" type="datetimeFigureOut">
               <a:rPr lang="pt-BR" smtClean="0"/>
-              <a:t>06/02/2017</a:t>
+              <a:t>13/02/2017</a:t>
             </a:fld>
             <a:endParaRPr lang="pt-BR"/>
           </a:p>
@@ -678,7 +679,7 @@
           <a:p>
             <a:fld id="{2E700DB3-DBF0-4086-B675-117E7A9610B8}" type="datetimeFigureOut">
               <a:rPr lang="pt-BR" smtClean="0"/>
-              <a:t>06/02/2017</a:t>
+              <a:t>13/02/2017</a:t>
             </a:fld>
             <a:endParaRPr lang="pt-BR"/>
           </a:p>
@@ -843,7 +844,7 @@
           <a:p>
             <a:fld id="{2E700DB3-DBF0-4086-B675-117E7A9610B8}" type="datetimeFigureOut">
               <a:rPr lang="pt-BR" smtClean="0"/>
-              <a:t>06/02/2017</a:t>
+              <a:t>13/02/2017</a:t>
             </a:fld>
             <a:endParaRPr lang="pt-BR"/>
           </a:p>
@@ -1091,7 +1092,7 @@
           <a:p>
             <a:fld id="{2E700DB3-DBF0-4086-B675-117E7A9610B8}" type="datetimeFigureOut">
               <a:rPr lang="pt-BR" smtClean="0"/>
-              <a:t>06/02/2017</a:t>
+              <a:t>13/02/2017</a:t>
             </a:fld>
             <a:endParaRPr lang="pt-BR"/>
           </a:p>
@@ -1409,7 +1410,7 @@
           <a:p>
             <a:fld id="{2E700DB3-DBF0-4086-B675-117E7A9610B8}" type="datetimeFigureOut">
               <a:rPr lang="pt-BR" smtClean="0"/>
-              <a:t>06/02/2017</a:t>
+              <a:t>13/02/2017</a:t>
             </a:fld>
             <a:endParaRPr lang="pt-BR"/>
           </a:p>
@@ -1875,7 +1876,7 @@
           <a:p>
             <a:fld id="{2E700DB3-DBF0-4086-B675-117E7A9610B8}" type="datetimeFigureOut">
               <a:rPr lang="pt-BR" smtClean="0"/>
-              <a:t>06/02/2017</a:t>
+              <a:t>13/02/2017</a:t>
             </a:fld>
             <a:endParaRPr lang="pt-BR"/>
           </a:p>
@@ -2023,7 +2024,7 @@
           <a:p>
             <a:fld id="{2E700DB3-DBF0-4086-B675-117E7A9610B8}" type="datetimeFigureOut">
               <a:rPr lang="pt-BR" smtClean="0"/>
-              <a:t>06/02/2017</a:t>
+              <a:t>13/02/2017</a:t>
             </a:fld>
             <a:endParaRPr lang="pt-BR"/>
           </a:p>
@@ -2113,7 +2114,7 @@
           <a:p>
             <a:fld id="{2E700DB3-DBF0-4086-B675-117E7A9610B8}" type="datetimeFigureOut">
               <a:rPr lang="pt-BR" smtClean="0"/>
-              <a:t>06/02/2017</a:t>
+              <a:t>13/02/2017</a:t>
             </a:fld>
             <a:endParaRPr lang="pt-BR"/>
           </a:p>
@@ -2387,7 +2388,7 @@
           <a:p>
             <a:fld id="{2E700DB3-DBF0-4086-B675-117E7A9610B8}" type="datetimeFigureOut">
               <a:rPr lang="pt-BR" smtClean="0"/>
-              <a:t>06/02/2017</a:t>
+              <a:t>13/02/2017</a:t>
             </a:fld>
             <a:endParaRPr lang="pt-BR"/>
           </a:p>
@@ -2692,7 +2693,7 @@
           <a:p>
             <a:fld id="{2E700DB3-DBF0-4086-B675-117E7A9610B8}" type="datetimeFigureOut">
               <a:rPr lang="pt-BR" smtClean="0"/>
-              <a:t>06/02/2017</a:t>
+              <a:t>13/02/2017</a:t>
             </a:fld>
             <a:endParaRPr lang="pt-BR"/>
           </a:p>
@@ -2990,7 +2991,7 @@
           <a:p>
             <a:fld id="{2E700DB3-DBF0-4086-B675-117E7A9610B8}" type="datetimeFigureOut">
               <a:rPr lang="pt-BR" smtClean="0"/>
-              <a:t>06/02/2017</a:t>
+              <a:t>13/02/2017</a:t>
             </a:fld>
             <a:endParaRPr lang="pt-BR"/>
           </a:p>
@@ -3502,6 +3503,137 @@
       </p:par>
     </p:tnLst>
   </p:timing>
+</p:sld>
+</file>
+
+<file path=ppt/slides/slide10.xml><?xml version="1.0" encoding="utf-8"?>
+<p:sld xmlns:a="http://schemas.openxmlformats.org/drawingml/2006/main" xmlns:r="http://schemas.openxmlformats.org/officeDocument/2006/relationships" xmlns:p="http://schemas.openxmlformats.org/presentationml/2006/main">
+  <p:cSld>
+    <p:spTree>
+      <p:nvGrpSpPr>
+        <p:cNvPr id="1" name=""/>
+        <p:cNvGrpSpPr/>
+        <p:nvPr/>
+      </p:nvGrpSpPr>
+      <p:grpSpPr>
+        <a:xfrm>
+          <a:off x="0" y="0"/>
+          <a:ext cx="0" cy="0"/>
+          <a:chOff x="0" y="0"/>
+          <a:chExt cx="0" cy="0"/>
+        </a:xfrm>
+      </p:grpSpPr>
+      <p:sp>
+        <p:nvSpPr>
+          <p:cNvPr id="2" name="Título 1"/>
+          <p:cNvSpPr>
+            <a:spLocks noGrp="1"/>
+          </p:cNvSpPr>
+          <p:nvPr>
+            <p:ph type="title"/>
+          </p:nvPr>
+        </p:nvSpPr>
+        <p:spPr/>
+        <p:txBody>
+          <a:bodyPr/>
+          <a:lstStyle/>
+          <a:p>
+            <a:r>
+              <a:rPr lang="pt-BR" dirty="0" smtClean="0"/>
+              <a:t>AOB</a:t>
+            </a:r>
+            <a:endParaRPr lang="pt-BR" dirty="0"/>
+          </a:p>
+        </p:txBody>
+      </p:sp>
+      <p:sp>
+        <p:nvSpPr>
+          <p:cNvPr id="3" name="Espaço Reservado para Conteúdo 2"/>
+          <p:cNvSpPr>
+            <a:spLocks noGrp="1"/>
+          </p:cNvSpPr>
+          <p:nvPr>
+            <p:ph idx="1"/>
+          </p:nvPr>
+        </p:nvSpPr>
+        <p:spPr/>
+        <p:txBody>
+          <a:bodyPr/>
+          <a:lstStyle/>
+          <a:p>
+            <a:r>
+              <a:rPr lang="pt-BR" dirty="0" err="1" smtClean="0"/>
+              <a:t>How</a:t>
+            </a:r>
+            <a:r>
+              <a:rPr lang="pt-BR" dirty="0" smtClean="0"/>
+              <a:t> </a:t>
+            </a:r>
+            <a:r>
+              <a:rPr lang="pt-BR" dirty="0" err="1" smtClean="0"/>
+              <a:t>to</a:t>
+            </a:r>
+            <a:r>
+              <a:rPr lang="pt-BR" dirty="0" smtClean="0"/>
+              <a:t> </a:t>
+            </a:r>
+            <a:r>
+              <a:rPr lang="pt-BR" dirty="0" err="1" smtClean="0"/>
+              <a:t>calculate</a:t>
+            </a:r>
+            <a:r>
+              <a:rPr lang="pt-BR" dirty="0" smtClean="0"/>
+              <a:t> performance </a:t>
+            </a:r>
+            <a:r>
+              <a:rPr lang="pt-BR" dirty="0" err="1" smtClean="0"/>
+              <a:t>degradation</a:t>
+            </a:r>
+            <a:r>
+              <a:rPr lang="pt-BR" dirty="0" smtClean="0"/>
+              <a:t> </a:t>
+            </a:r>
+            <a:r>
+              <a:rPr lang="pt-BR" dirty="0" err="1" smtClean="0"/>
+              <a:t>of</a:t>
+            </a:r>
+            <a:r>
+              <a:rPr lang="pt-BR" dirty="0" smtClean="0"/>
+              <a:t> IMT?</a:t>
+            </a:r>
+          </a:p>
+          <a:p>
+            <a:pPr lvl="1"/>
+            <a:r>
+              <a:rPr lang="pt-BR" dirty="0" err="1" smtClean="0"/>
+              <a:t>Check</a:t>
+            </a:r>
+            <a:r>
+              <a:rPr lang="pt-BR" dirty="0" smtClean="0"/>
+              <a:t> e-mail </a:t>
+            </a:r>
+            <a:r>
+              <a:rPr lang="pt-BR" dirty="0" err="1" smtClean="0"/>
+              <a:t>from</a:t>
+            </a:r>
+            <a:r>
+              <a:rPr lang="pt-BR" smtClean="0"/>
+              <a:t> Tarcisio</a:t>
+            </a:r>
+            <a:endParaRPr lang="pt-BR"/>
+          </a:p>
+        </p:txBody>
+      </p:sp>
+    </p:spTree>
+    <p:extLst>
+      <p:ext uri="{BB962C8B-B14F-4D97-AF65-F5344CB8AC3E}">
+        <p14:creationId xmlns:p14="http://schemas.microsoft.com/office/powerpoint/2010/main" val="3874876216"/>
+      </p:ext>
+    </p:extLst>
+  </p:cSld>
+  <p:clrMapOvr>
+    <a:masterClrMapping/>
+  </p:clrMapOvr>
 </p:sld>
 </file>
 
@@ -4650,6 +4782,13 @@
   <p:clrMapOvr>
     <a:masterClrMapping/>
   </p:clrMapOvr>
+  <p:timing>
+    <p:tnLst>
+      <p:par>
+        <p:cTn id="1" dur="indefinite" restart="never" nodeType="tmRoot"/>
+      </p:par>
+    </p:tnLst>
+  </p:timing>
 </p:sld>
 </file>
 
@@ -4686,8 +4825,20 @@
           <a:lstStyle/>
           <a:p>
             <a:r>
-              <a:rPr lang="pt-BR" dirty="0" err="1" smtClean="0"/>
-              <a:t>Repositories</a:t>
+              <a:rPr lang="pt-BR" dirty="0" smtClean="0"/>
+              <a:t>Project-</a:t>
+            </a:r>
+            <a:r>
+              <a:rPr lang="pt-BR" dirty="0" err="1" smtClean="0"/>
+              <a:t>specific</a:t>
+            </a:r>
+            <a:r>
+              <a:rPr lang="pt-BR" dirty="0" smtClean="0"/>
+              <a:t> </a:t>
+            </a:r>
+            <a:r>
+              <a:rPr lang="pt-BR" dirty="0" err="1" smtClean="0"/>
+              <a:t>conventions</a:t>
             </a:r>
             <a:endParaRPr lang="pt-BR" dirty="0"/>
           </a:p>
@@ -4705,12 +4856,18 @@
         </p:nvSpPr>
         <p:spPr/>
         <p:txBody>
-          <a:bodyPr/>
-          <a:lstStyle/>
-          <a:p>
-            <a:r>
-              <a:rPr lang="pt-BR" dirty="0" err="1" smtClean="0"/>
-              <a:t>Source</a:t>
+          <a:bodyPr>
+            <a:normAutofit/>
+          </a:bodyPr>
+          <a:lstStyle/>
+          <a:p>
+            <a:r>
+              <a:rPr lang="pt-BR" dirty="0" smtClean="0"/>
+              <a:t>Use Python 3.5 </a:t>
+            </a:r>
+            <a:r>
+              <a:rPr lang="pt-BR" dirty="0" err="1" smtClean="0"/>
+              <a:t>type</a:t>
             </a:r>
             <a:r>
               <a:rPr lang="pt-BR" dirty="0" smtClean="0"/>
@@ -4718,85 +4875,446 @@
             </a:r>
             <a:r>
               <a:rPr lang="pt-BR" dirty="0" err="1" smtClean="0"/>
-              <a:t>code</a:t>
+              <a:t>hinting</a:t>
+            </a:r>
+            <a:r>
+              <a:rPr lang="pt-BR" dirty="0" smtClean="0"/>
+              <a:t>:</a:t>
+            </a:r>
+          </a:p>
+          <a:p>
+            <a:endParaRPr lang="pt-BR" dirty="0"/>
+          </a:p>
+          <a:p>
+            <a:endParaRPr lang="pt-BR" dirty="0" smtClean="0"/>
+          </a:p>
+          <a:p>
+            <a:endParaRPr lang="pt-BR" dirty="0"/>
+          </a:p>
+          <a:p>
+            <a:endParaRPr lang="pt-BR" dirty="0" smtClean="0"/>
+          </a:p>
+          <a:p>
+            <a:endParaRPr lang="pt-BR" dirty="0"/>
+          </a:p>
+          <a:p>
+            <a:endParaRPr lang="pt-BR" dirty="0" smtClean="0"/>
+          </a:p>
+          <a:p>
+            <a:r>
+              <a:rPr lang="pt-BR" dirty="0" err="1" smtClean="0"/>
+              <a:t>Read</a:t>
+            </a:r>
+            <a:r>
+              <a:rPr lang="pt-BR" dirty="0" smtClean="0"/>
+              <a:t> more </a:t>
+            </a:r>
+            <a:r>
+              <a:rPr lang="pt-BR" dirty="0" err="1" smtClean="0"/>
+              <a:t>about</a:t>
+            </a:r>
+            <a:r>
+              <a:rPr lang="pt-BR" dirty="0" smtClean="0"/>
+              <a:t> it:</a:t>
+            </a:r>
+          </a:p>
+          <a:p>
+            <a:pPr lvl="1"/>
+            <a:r>
+              <a:rPr lang="pt-BR" dirty="0">
+                <a:hlinkClick r:id="rId2"/>
+              </a:rPr>
+              <a:t>https://blog.jetbrains.com/pycharm/2015/11/python-3-5-type-hinting-in-pycharm-5</a:t>
+            </a:r>
+            <a:r>
+              <a:rPr lang="pt-BR" dirty="0" smtClean="0">
+                <a:hlinkClick r:id="rId2"/>
+              </a:rPr>
+              <a:t>/</a:t>
+            </a:r>
+            <a:endParaRPr lang="pt-BR" dirty="0" smtClean="0"/>
+          </a:p>
+          <a:p>
+            <a:pPr lvl="1"/>
+            <a:r>
+              <a:rPr lang="pt-BR" dirty="0">
+                <a:hlinkClick r:id="rId3"/>
+              </a:rPr>
+              <a:t>https://www.python.org/dev/peps/pep-0484</a:t>
+            </a:r>
+            <a:r>
+              <a:rPr lang="pt-BR" dirty="0" smtClean="0">
+                <a:hlinkClick r:id="rId3"/>
+              </a:rPr>
+              <a:t>/</a:t>
             </a:r>
             <a:r>
               <a:rPr lang="pt-BR" dirty="0" smtClean="0"/>
               <a:t> </a:t>
             </a:r>
-            <a:r>
-              <a:rPr lang="pt-BR" dirty="0" err="1" smtClean="0"/>
-              <a:t>repository</a:t>
-            </a:r>
-            <a:endParaRPr lang="pt-BR" dirty="0" smtClean="0"/>
-          </a:p>
-          <a:p>
             <a:endParaRPr lang="pt-BR" dirty="0"/>
           </a:p>
-          <a:p>
-            <a:r>
-              <a:rPr lang="pt-BR" dirty="0" smtClean="0"/>
-              <a:t>ANATEL </a:t>
-            </a:r>
-            <a:r>
-              <a:rPr lang="pt-BR" dirty="0" err="1" smtClean="0"/>
-              <a:t>Cloud</a:t>
-            </a:r>
-            <a:r>
-              <a:rPr lang="pt-BR" dirty="0" smtClean="0"/>
-              <a:t> for </a:t>
-            </a:r>
-            <a:r>
-              <a:rPr lang="pt-BR" dirty="0" err="1" smtClean="0"/>
-              <a:t>sharing</a:t>
-            </a:r>
-            <a:r>
-              <a:rPr lang="pt-BR" dirty="0" smtClean="0"/>
+        </p:txBody>
+      </p:sp>
+      <p:sp>
+        <p:nvSpPr>
+          <p:cNvPr id="4" name="CaixaDeTexto 3"/>
+          <p:cNvSpPr txBox="1"/>
+          <p:nvPr/>
+        </p:nvSpPr>
+        <p:spPr>
+          <a:xfrm>
+            <a:off x="2051720" y="2422629"/>
+            <a:ext cx="5009705" cy="646331"/>
+          </a:xfrm>
+          <a:prstGeom prst="rect">
+            <a:avLst/>
+          </a:prstGeom>
+          <a:noFill/>
+          <a:ln>
+            <a:solidFill>
+              <a:schemeClr val="tx1"/>
+            </a:solidFill>
+          </a:ln>
+        </p:spPr>
+        <p:txBody>
+          <a:bodyPr wrap="none" rtlCol="0">
+            <a:spAutoFit/>
+          </a:bodyPr>
+          <a:lstStyle/>
+          <a:p>
+            <a:r>
+              <a:rPr lang="en-US" dirty="0" err="1">
+                <a:solidFill>
+                  <a:srgbClr val="0070C0"/>
+                </a:solidFill>
+                <a:latin typeface="Courier New" pitchFamily="49" charset="0"/>
+                <a:cs typeface="Courier New" pitchFamily="49" charset="0"/>
+              </a:rPr>
+              <a:t>def</a:t>
+            </a:r>
+            <a:r>
+              <a:rPr lang="en-US" dirty="0">
+                <a:solidFill>
+                  <a:srgbClr val="0070C0"/>
+                </a:solidFill>
+                <a:latin typeface="Courier New" pitchFamily="49" charset="0"/>
+                <a:cs typeface="Courier New" pitchFamily="49" charset="0"/>
+              </a:rPr>
               <a:t> </a:t>
             </a:r>
             <a:r>
-              <a:rPr lang="pt-BR" dirty="0" err="1" smtClean="0"/>
-              <a:t>documents</a:t>
-            </a:r>
-            <a:endParaRPr lang="pt-BR" dirty="0" smtClean="0"/>
-          </a:p>
-          <a:p>
-            <a:pPr lvl="1"/>
-            <a:r>
-              <a:rPr lang="pt-BR" dirty="0" err="1" smtClean="0"/>
-              <a:t>GitHub</a:t>
-            </a:r>
-            <a:endParaRPr lang="pt-BR" dirty="0" smtClean="0"/>
-          </a:p>
-          <a:p>
-            <a:pPr lvl="1"/>
-            <a:r>
-              <a:rPr lang="pt-BR" dirty="0" smtClean="0"/>
-              <a:t>Google Drive</a:t>
-            </a:r>
-          </a:p>
-          <a:p>
-            <a:pPr lvl="1"/>
-            <a:endParaRPr lang="pt-BR" dirty="0"/>
-          </a:p>
-          <a:p>
-            <a:endParaRPr lang="pt-BR" dirty="0"/>
-          </a:p>
-          <a:p>
-            <a:endParaRPr lang="pt-BR" dirty="0"/>
-          </a:p>
-        </p:txBody>
-      </p:sp>
+              <a:rPr lang="en-US" b="1" dirty="0" smtClean="0">
+                <a:latin typeface="Courier New" pitchFamily="49" charset="0"/>
+                <a:cs typeface="Courier New" pitchFamily="49" charset="0"/>
+              </a:rPr>
+              <a:t>greeting</a:t>
+            </a:r>
+            <a:r>
+              <a:rPr lang="en-US" dirty="0" smtClean="0">
+                <a:latin typeface="Courier New" pitchFamily="49" charset="0"/>
+                <a:cs typeface="Courier New" pitchFamily="49" charset="0"/>
+              </a:rPr>
+              <a:t>(</a:t>
+            </a:r>
+            <a:r>
+              <a:rPr lang="en-US" dirty="0" smtClean="0">
+                <a:solidFill>
+                  <a:srgbClr val="C00000"/>
+                </a:solidFill>
+                <a:latin typeface="Courier New" pitchFamily="49" charset="0"/>
+                <a:cs typeface="Courier New" pitchFamily="49" charset="0"/>
+              </a:rPr>
+              <a:t>name</a:t>
+            </a:r>
+            <a:r>
+              <a:rPr lang="en-US" dirty="0" smtClean="0">
+                <a:latin typeface="Courier New" pitchFamily="49" charset="0"/>
+                <a:cs typeface="Courier New" pitchFamily="49" charset="0"/>
+              </a:rPr>
+              <a:t>):</a:t>
+            </a:r>
+            <a:endParaRPr lang="en-US" dirty="0">
+              <a:latin typeface="Courier New" pitchFamily="49" charset="0"/>
+              <a:cs typeface="Courier New" pitchFamily="49" charset="0"/>
+            </a:endParaRPr>
+          </a:p>
+          <a:p>
+            <a:r>
+              <a:rPr lang="en-US" dirty="0">
+                <a:latin typeface="Courier New" pitchFamily="49" charset="0"/>
+                <a:cs typeface="Courier New" pitchFamily="49" charset="0"/>
+              </a:rPr>
+              <a:t>    </a:t>
+            </a:r>
+            <a:r>
+              <a:rPr lang="en-US" dirty="0">
+                <a:solidFill>
+                  <a:srgbClr val="0070C0"/>
+                </a:solidFill>
+                <a:latin typeface="Courier New" pitchFamily="49" charset="0"/>
+                <a:cs typeface="Courier New" pitchFamily="49" charset="0"/>
+              </a:rPr>
+              <a:t>return</a:t>
+            </a:r>
+            <a:r>
+              <a:rPr lang="en-US" dirty="0">
+                <a:latin typeface="Courier New" pitchFamily="49" charset="0"/>
+                <a:cs typeface="Courier New" pitchFamily="49" charset="0"/>
+              </a:rPr>
+              <a:t> 'Hello, {}'.format(name</a:t>
+            </a:r>
+            <a:r>
+              <a:rPr lang="en-US" dirty="0" smtClean="0">
+                <a:latin typeface="Courier New" pitchFamily="49" charset="0"/>
+                <a:cs typeface="Courier New" pitchFamily="49" charset="0"/>
+              </a:rPr>
+              <a:t>)</a:t>
+            </a:r>
+            <a:endParaRPr lang="pt-BR" dirty="0">
+              <a:latin typeface="Courier New" pitchFamily="49" charset="0"/>
+              <a:cs typeface="Courier New" pitchFamily="49" charset="0"/>
+            </a:endParaRPr>
+          </a:p>
+        </p:txBody>
+      </p:sp>
+      <p:sp>
+        <p:nvSpPr>
+          <p:cNvPr id="6" name="CaixaDeTexto 5"/>
+          <p:cNvSpPr txBox="1"/>
+          <p:nvPr/>
+        </p:nvSpPr>
+        <p:spPr>
+          <a:xfrm>
+            <a:off x="2051720" y="3574757"/>
+            <a:ext cx="5009705" cy="646331"/>
+          </a:xfrm>
+          <a:prstGeom prst="rect">
+            <a:avLst/>
+          </a:prstGeom>
+          <a:noFill/>
+          <a:ln>
+            <a:solidFill>
+              <a:schemeClr val="tx1"/>
+            </a:solidFill>
+          </a:ln>
+        </p:spPr>
+        <p:txBody>
+          <a:bodyPr wrap="none" rtlCol="0">
+            <a:spAutoFit/>
+          </a:bodyPr>
+          <a:lstStyle/>
+          <a:p>
+            <a:r>
+              <a:rPr lang="en-US" dirty="0" err="1">
+                <a:solidFill>
+                  <a:srgbClr val="0070C0"/>
+                </a:solidFill>
+                <a:latin typeface="Courier New" pitchFamily="49" charset="0"/>
+                <a:cs typeface="Courier New" pitchFamily="49" charset="0"/>
+              </a:rPr>
+              <a:t>def</a:t>
+            </a:r>
+            <a:r>
+              <a:rPr lang="en-US" dirty="0">
+                <a:solidFill>
+                  <a:srgbClr val="0070C0"/>
+                </a:solidFill>
+                <a:latin typeface="Courier New" pitchFamily="49" charset="0"/>
+                <a:cs typeface="Courier New" pitchFamily="49" charset="0"/>
+              </a:rPr>
+              <a:t> </a:t>
+            </a:r>
+            <a:r>
+              <a:rPr lang="en-US" b="1" dirty="0">
+                <a:latin typeface="Courier New" pitchFamily="49" charset="0"/>
+                <a:cs typeface="Courier New" pitchFamily="49" charset="0"/>
+              </a:rPr>
+              <a:t>greeting</a:t>
+            </a:r>
+            <a:r>
+              <a:rPr lang="en-US" dirty="0">
+                <a:latin typeface="Courier New" pitchFamily="49" charset="0"/>
+                <a:cs typeface="Courier New" pitchFamily="49" charset="0"/>
+              </a:rPr>
+              <a:t>(</a:t>
+            </a:r>
+            <a:r>
+              <a:rPr lang="en-US" dirty="0">
+                <a:solidFill>
+                  <a:srgbClr val="C00000"/>
+                </a:solidFill>
+                <a:latin typeface="Courier New" pitchFamily="49" charset="0"/>
+                <a:cs typeface="Courier New" pitchFamily="49" charset="0"/>
+              </a:rPr>
+              <a:t>name: </a:t>
+            </a:r>
+            <a:r>
+              <a:rPr lang="en-US" dirty="0" err="1">
+                <a:solidFill>
+                  <a:srgbClr val="C00000"/>
+                </a:solidFill>
+                <a:latin typeface="Courier New" pitchFamily="49" charset="0"/>
+                <a:cs typeface="Courier New" pitchFamily="49" charset="0"/>
+              </a:rPr>
+              <a:t>str</a:t>
+            </a:r>
+            <a:r>
+              <a:rPr lang="en-US" dirty="0">
+                <a:latin typeface="Courier New" pitchFamily="49" charset="0"/>
+                <a:cs typeface="Courier New" pitchFamily="49" charset="0"/>
+              </a:rPr>
+              <a:t>) -&gt; </a:t>
+            </a:r>
+            <a:r>
+              <a:rPr lang="en-US" dirty="0" err="1">
+                <a:solidFill>
+                  <a:srgbClr val="7030A0"/>
+                </a:solidFill>
+                <a:latin typeface="Courier New" pitchFamily="49" charset="0"/>
+                <a:cs typeface="Courier New" pitchFamily="49" charset="0"/>
+              </a:rPr>
+              <a:t>str</a:t>
+            </a:r>
+            <a:r>
+              <a:rPr lang="en-US" dirty="0">
+                <a:latin typeface="Courier New" pitchFamily="49" charset="0"/>
+                <a:cs typeface="Courier New" pitchFamily="49" charset="0"/>
+              </a:rPr>
+              <a:t>:</a:t>
+            </a:r>
+          </a:p>
+          <a:p>
+            <a:r>
+              <a:rPr lang="en-US" dirty="0">
+                <a:latin typeface="Courier New" pitchFamily="49" charset="0"/>
+                <a:cs typeface="Courier New" pitchFamily="49" charset="0"/>
+              </a:rPr>
+              <a:t>    </a:t>
+            </a:r>
+            <a:r>
+              <a:rPr lang="en-US" dirty="0">
+                <a:solidFill>
+                  <a:srgbClr val="0070C0"/>
+                </a:solidFill>
+                <a:latin typeface="Courier New" pitchFamily="49" charset="0"/>
+                <a:cs typeface="Courier New" pitchFamily="49" charset="0"/>
+              </a:rPr>
+              <a:t>return</a:t>
+            </a:r>
+            <a:r>
+              <a:rPr lang="en-US" dirty="0">
+                <a:latin typeface="Courier New" pitchFamily="49" charset="0"/>
+                <a:cs typeface="Courier New" pitchFamily="49" charset="0"/>
+              </a:rPr>
+              <a:t> 'Hello, {}'.format(name)</a:t>
+            </a:r>
+            <a:endParaRPr lang="pt-BR" dirty="0">
+              <a:latin typeface="Courier New" pitchFamily="49" charset="0"/>
+              <a:cs typeface="Courier New" pitchFamily="49" charset="0"/>
+            </a:endParaRPr>
+          </a:p>
+        </p:txBody>
+      </p:sp>
+      <p:pic>
+        <p:nvPicPr>
+          <p:cNvPr id="2050" name="Picture 2" descr="C:\Users\edgar\AppData\Local\Microsoft\Windows\Temporary Internet Files\Content.IE5\AC9MZ6HB\Yes_check.svg[1].png"/>
+          <p:cNvPicPr>
+            <a:picLocks noChangeAspect="1" noChangeArrowheads="1"/>
+          </p:cNvPicPr>
+          <p:nvPr/>
+        </p:nvPicPr>
+        <p:blipFill>
+          <a:blip r:embed="rId4" cstate="print">
+            <a:extLst>
+              <a:ext uri="{28A0092B-C50C-407E-A947-70E740481C1C}">
+                <a14:useLocalDpi xmlns:a14="http://schemas.microsoft.com/office/drawing/2010/main" val="0"/>
+              </a:ext>
+            </a:extLst>
+          </a:blip>
+          <a:srcRect/>
+          <a:stretch>
+            <a:fillRect/>
+          </a:stretch>
+        </p:blipFill>
+        <p:spPr bwMode="auto">
+          <a:xfrm>
+            <a:off x="7323137" y="3574757"/>
+            <a:ext cx="646331" cy="646331"/>
+          </a:xfrm>
+          <a:prstGeom prst="rect">
+            <a:avLst/>
+          </a:prstGeom>
+          <a:noFill/>
+          <a:extLst>
+            <a:ext uri="{909E8E84-426E-40DD-AFC4-6F175D3DCCD1}">
+              <a14:hiddenFill xmlns:a14="http://schemas.microsoft.com/office/drawing/2010/main">
+                <a:solidFill>
+                  <a:srgbClr val="FFFFFF"/>
+                </a:solidFill>
+              </a14:hiddenFill>
+            </a:ext>
+          </a:extLst>
+        </p:spPr>
+      </p:pic>
+      <p:pic>
+        <p:nvPicPr>
+          <p:cNvPr id="2051" name="Picture 3" descr="C:\Users\edgar\AppData\Local\Microsoft\Windows\Temporary Internet Files\Content.IE5\BJLV8WGV\PngMedium-Wrong-sign-3303[1].gif"/>
+          <p:cNvPicPr>
+            <a:picLocks noChangeAspect="1" noChangeArrowheads="1"/>
+          </p:cNvPicPr>
+          <p:nvPr/>
+        </p:nvPicPr>
+        <p:blipFill>
+          <a:blip r:embed="rId5" cstate="print">
+            <a:extLst>
+              <a:ext uri="{28A0092B-C50C-407E-A947-70E740481C1C}">
+                <a14:useLocalDpi xmlns:a14="http://schemas.microsoft.com/office/drawing/2010/main" val="0"/>
+              </a:ext>
+            </a:extLst>
+          </a:blip>
+          <a:srcRect/>
+          <a:stretch>
+            <a:fillRect/>
+          </a:stretch>
+        </p:blipFill>
+        <p:spPr bwMode="auto">
+          <a:xfrm>
+            <a:off x="7323137" y="2422628"/>
+            <a:ext cx="646331" cy="646331"/>
+          </a:xfrm>
+          <a:prstGeom prst="rect">
+            <a:avLst/>
+          </a:prstGeom>
+          <a:noFill/>
+          <a:extLst>
+            <a:ext uri="{909E8E84-426E-40DD-AFC4-6F175D3DCCD1}">
+              <a14:hiddenFill xmlns:a14="http://schemas.microsoft.com/office/drawing/2010/main">
+                <a:solidFill>
+                  <a:srgbClr val="FFFFFF"/>
+                </a:solidFill>
+              </a14:hiddenFill>
+            </a:ext>
+          </a:extLst>
+        </p:spPr>
+      </p:pic>
     </p:spTree>
     <p:extLst>
       <p:ext uri="{BB962C8B-B14F-4D97-AF65-F5344CB8AC3E}">
-        <p14:creationId xmlns:p14="http://schemas.microsoft.com/office/powerpoint/2010/main" val="278294855"/>
+        <p14:creationId xmlns:p14="http://schemas.microsoft.com/office/powerpoint/2010/main" val="3096679315"/>
       </p:ext>
     </p:extLst>
   </p:cSld>
   <p:clrMapOvr>
     <a:masterClrMapping/>
   </p:clrMapOvr>
+  <p:timing>
+    <p:tnLst>
+      <p:par>
+        <p:cTn id="1" dur="indefinite" restart="never" nodeType="tmRoot"/>
+      </p:par>
+    </p:tnLst>
+  </p:timing>
 </p:sld>
 </file>
 
@@ -4833,12 +5351,24 @@
           <a:lstStyle/>
           <a:p>
             <a:r>
-              <a:rPr lang="pt-BR" dirty="0" smtClean="0"/>
-              <a:t>Project </a:t>
-            </a:r>
-            <a:r>
-              <a:rPr lang="pt-BR" dirty="0" err="1" smtClean="0"/>
-              <a:t>tracking</a:t>
+              <a:rPr lang="pt-BR" dirty="0" err="1" smtClean="0"/>
+              <a:t>Repositories</a:t>
+            </a:r>
+            <a:r>
+              <a:rPr lang="pt-BR" dirty="0" smtClean="0"/>
+              <a:t> </a:t>
+            </a:r>
+            <a:r>
+              <a:rPr lang="pt-BR" dirty="0" err="1" smtClean="0"/>
+              <a:t>and</a:t>
+            </a:r>
+            <a:r>
+              <a:rPr lang="pt-BR" dirty="0" smtClean="0"/>
+              <a:t> </a:t>
+            </a:r>
+            <a:r>
+              <a:rPr lang="pt-BR" dirty="0" err="1" smtClean="0"/>
+              <a:t>branches</a:t>
             </a:r>
             <a:endParaRPr lang="pt-BR" dirty="0"/>
           </a:p>
@@ -4856,12 +5386,18 @@
         </p:nvSpPr>
         <p:spPr/>
         <p:txBody>
-          <a:bodyPr/>
-          <a:lstStyle/>
-          <a:p>
-            <a:r>
-              <a:rPr lang="pt-BR" dirty="0" err="1" smtClean="0"/>
-              <a:t>Work</a:t>
+          <a:bodyPr>
+            <a:noAutofit/>
+          </a:bodyPr>
+          <a:lstStyle/>
+          <a:p>
+            <a:r>
+              <a:rPr lang="pt-BR" dirty="0" err="1" smtClean="0"/>
+              <a:t>Git</a:t>
+            </a:r>
+            <a:r>
+              <a:rPr lang="pt-BR" dirty="0" err="1" smtClean="0"/>
+              <a:t>Hub</a:t>
             </a:r>
             <a:r>
               <a:rPr lang="pt-BR" dirty="0" smtClean="0"/>
@@ -4869,7 +5405,7 @@
             </a:r>
             <a:r>
               <a:rPr lang="pt-BR" dirty="0" err="1" smtClean="0"/>
-              <a:t>will</a:t>
+              <a:t>is</a:t>
             </a:r>
             <a:r>
               <a:rPr lang="pt-BR" dirty="0" smtClean="0"/>
@@ -4877,7 +5413,7 @@
             </a:r>
             <a:r>
               <a:rPr lang="pt-BR" dirty="0" err="1" smtClean="0"/>
-              <a:t>be</a:t>
+              <a:t>hosting</a:t>
             </a:r>
             <a:r>
               <a:rPr lang="pt-BR" dirty="0" smtClean="0"/>
@@ -4885,7 +5421,7 @@
             </a:r>
             <a:r>
               <a:rPr lang="pt-BR" dirty="0" err="1" smtClean="0"/>
-              <a:t>tracked</a:t>
+              <a:t>the</a:t>
             </a:r>
             <a:r>
               <a:rPr lang="pt-BR" dirty="0" smtClean="0"/>
@@ -4893,50 +5429,222 @@
             </a:r>
             <a:r>
               <a:rPr lang="pt-BR" dirty="0" err="1" smtClean="0"/>
-              <a:t>using</a:t>
-            </a:r>
-            <a:r>
-              <a:rPr lang="pt-BR" dirty="0" smtClean="0"/>
-              <a:t> ASANA (</a:t>
-            </a:r>
-            <a:r>
-              <a:rPr lang="pt-BR" dirty="0" err="1" smtClean="0"/>
-              <a:t>or</a:t>
-            </a:r>
-            <a:r>
-              <a:rPr lang="pt-BR" dirty="0" smtClean="0"/>
-              <a:t> TRELLO??)</a:t>
-            </a:r>
-          </a:p>
-          <a:p>
-            <a:r>
-              <a:rPr lang="pt-BR" dirty="0" smtClean="0"/>
-              <a:t>SCRUM-</a:t>
-            </a:r>
-            <a:r>
-              <a:rPr lang="pt-BR" dirty="0" err="1" smtClean="0"/>
-              <a:t>based</a:t>
-            </a:r>
-            <a:r>
-              <a:rPr lang="pt-BR" dirty="0" smtClean="0"/>
-              <a:t>?</a:t>
-            </a:r>
-          </a:p>
-          <a:p>
+              <a:t>source</a:t>
+            </a:r>
+            <a:r>
+              <a:rPr lang="pt-BR" dirty="0" smtClean="0"/>
+              <a:t> </a:t>
+            </a:r>
+            <a:r>
+              <a:rPr lang="pt-BR" dirty="0" err="1" smtClean="0"/>
+              <a:t>code</a:t>
+            </a:r>
+            <a:r>
+              <a:rPr lang="pt-BR" dirty="0" smtClean="0"/>
+              <a:t> </a:t>
+            </a:r>
+            <a:r>
+              <a:rPr lang="pt-BR" dirty="0" err="1" smtClean="0"/>
+              <a:t>and</a:t>
+            </a:r>
+            <a:r>
+              <a:rPr lang="pt-BR" dirty="0" smtClean="0"/>
+              <a:t> </a:t>
+            </a:r>
+            <a:r>
+              <a:rPr lang="pt-BR" dirty="0" err="1" smtClean="0"/>
+              <a:t>related</a:t>
+            </a:r>
+            <a:r>
+              <a:rPr lang="pt-BR" dirty="0" smtClean="0"/>
+              <a:t> </a:t>
+            </a:r>
+            <a:r>
+              <a:rPr lang="pt-BR" dirty="0" err="1" smtClean="0"/>
+              <a:t>documents</a:t>
+            </a:r>
             <a:endParaRPr lang="pt-BR" dirty="0"/>
           </a:p>
-        </p:txBody>
-      </p:sp>
+          <a:p>
+            <a:endParaRPr lang="pt-BR" dirty="0" smtClean="0"/>
+          </a:p>
+          <a:p>
+            <a:endParaRPr lang="pt-BR" dirty="0"/>
+          </a:p>
+          <a:p>
+            <a:endParaRPr lang="pt-BR" dirty="0" smtClean="0"/>
+          </a:p>
+          <a:p>
+            <a:endParaRPr lang="pt-BR" dirty="0"/>
+          </a:p>
+          <a:p>
+            <a:endParaRPr lang="pt-BR" dirty="0" smtClean="0"/>
+          </a:p>
+          <a:p>
+            <a:endParaRPr lang="pt-BR" dirty="0"/>
+          </a:p>
+          <a:p>
+            <a:endParaRPr lang="pt-BR" dirty="0" smtClean="0"/>
+          </a:p>
+          <a:p>
+            <a:endParaRPr lang="pt-BR" dirty="0"/>
+          </a:p>
+          <a:p>
+            <a:r>
+              <a:rPr lang="pt-BR" dirty="0" err="1" smtClean="0"/>
+              <a:t>Learn</a:t>
+            </a:r>
+            <a:r>
+              <a:rPr lang="pt-BR" dirty="0" smtClean="0"/>
+              <a:t> more </a:t>
+            </a:r>
+            <a:r>
+              <a:rPr lang="pt-BR" dirty="0" err="1" smtClean="0"/>
+              <a:t>about</a:t>
+            </a:r>
+            <a:r>
+              <a:rPr lang="pt-BR" dirty="0" smtClean="0"/>
+              <a:t> </a:t>
+            </a:r>
+            <a:r>
+              <a:rPr lang="pt-BR" dirty="0" err="1" smtClean="0"/>
+              <a:t>Git</a:t>
+            </a:r>
+            <a:r>
+              <a:rPr lang="pt-BR" dirty="0" smtClean="0"/>
+              <a:t> </a:t>
+            </a:r>
+            <a:r>
+              <a:rPr lang="pt-BR" dirty="0" err="1" smtClean="0"/>
+              <a:t>and</a:t>
+            </a:r>
+            <a:r>
+              <a:rPr lang="pt-BR" dirty="0" smtClean="0"/>
+              <a:t> </a:t>
+            </a:r>
+            <a:r>
+              <a:rPr lang="pt-BR" dirty="0" err="1" smtClean="0"/>
+              <a:t>Git</a:t>
+            </a:r>
+            <a:r>
+              <a:rPr lang="pt-BR" dirty="0" smtClean="0"/>
+              <a:t> </a:t>
+            </a:r>
+            <a:r>
+              <a:rPr lang="pt-BR" dirty="0" err="1" smtClean="0"/>
+              <a:t>branching</a:t>
+            </a:r>
+            <a:r>
+              <a:rPr lang="pt-BR" dirty="0" smtClean="0"/>
+              <a:t>:</a:t>
+            </a:r>
+          </a:p>
+          <a:p>
+            <a:pPr lvl="1"/>
+            <a:r>
+              <a:rPr lang="pt-BR" dirty="0">
+                <a:hlinkClick r:id="rId2"/>
+              </a:rPr>
+              <a:t>https://backlogtool.com/git-guide/en</a:t>
+            </a:r>
+            <a:r>
+              <a:rPr lang="pt-BR" dirty="0" smtClean="0">
+                <a:hlinkClick r:id="rId2"/>
+              </a:rPr>
+              <a:t>/</a:t>
+            </a:r>
+            <a:r>
+              <a:rPr lang="pt-BR" dirty="0" smtClean="0"/>
+              <a:t> </a:t>
+            </a:r>
+            <a:endParaRPr lang="pt-BR" dirty="0"/>
+          </a:p>
+          <a:p>
+            <a:pPr lvl="1"/>
+            <a:r>
+              <a:rPr lang="pt-BR" dirty="0">
+                <a:hlinkClick r:id="rId3"/>
+              </a:rPr>
+              <a:t>http://nvie.com/posts/a-successful-git-branching-model</a:t>
+            </a:r>
+            <a:r>
+              <a:rPr lang="pt-BR" dirty="0" smtClean="0">
+                <a:hlinkClick r:id="rId3"/>
+              </a:rPr>
+              <a:t>/</a:t>
+            </a:r>
+            <a:r>
+              <a:rPr lang="pt-BR" dirty="0" smtClean="0"/>
+              <a:t> </a:t>
+            </a:r>
+            <a:endParaRPr lang="pt-BR" dirty="0"/>
+          </a:p>
+          <a:p>
+            <a:endParaRPr lang="pt-BR" dirty="0"/>
+          </a:p>
+          <a:p>
+            <a:endParaRPr lang="pt-BR" dirty="0"/>
+          </a:p>
+        </p:txBody>
+      </p:sp>
+      <p:pic>
+        <p:nvPicPr>
+          <p:cNvPr id="1026" name="Picture 2" descr="Branch model at Git"/>
+          <p:cNvPicPr>
+            <a:picLocks noChangeAspect="1" noChangeArrowheads="1"/>
+          </p:cNvPicPr>
+          <p:nvPr/>
+        </p:nvPicPr>
+        <p:blipFill>
+          <a:blip r:embed="rId4">
+            <a:extLst>
+              <a:ext uri="{28A0092B-C50C-407E-A947-70E740481C1C}">
+                <a14:useLocalDpi xmlns:a14="http://schemas.microsoft.com/office/drawing/2010/main" val="0"/>
+              </a:ext>
+            </a:extLst>
+          </a:blip>
+          <a:srcRect/>
+          <a:stretch>
+            <a:fillRect/>
+          </a:stretch>
+        </p:blipFill>
+        <p:spPr bwMode="auto">
+          <a:xfrm>
+            <a:off x="1907704" y="2132856"/>
+            <a:ext cx="5160268" cy="3337937"/>
+          </a:xfrm>
+          <a:prstGeom prst="rect">
+            <a:avLst/>
+          </a:prstGeom>
+          <a:noFill/>
+          <a:extLst>
+            <a:ext uri="{909E8E84-426E-40DD-AFC4-6F175D3DCCD1}">
+              <a14:hiddenFill xmlns:a14="http://schemas.microsoft.com/office/drawing/2010/main">
+                <a:solidFill>
+                  <a:srgbClr val="FFFFFF"/>
+                </a:solidFill>
+              </a14:hiddenFill>
+            </a:ext>
+          </a:extLst>
+        </p:spPr>
+      </p:pic>
     </p:spTree>
     <p:extLst>
       <p:ext uri="{BB962C8B-B14F-4D97-AF65-F5344CB8AC3E}">
-        <p14:creationId xmlns:p14="http://schemas.microsoft.com/office/powerpoint/2010/main" val="3698729868"/>
+        <p14:creationId xmlns:p14="http://schemas.microsoft.com/office/powerpoint/2010/main" val="278294855"/>
       </p:ext>
     </p:extLst>
   </p:cSld>
   <p:clrMapOvr>
     <a:masterClrMapping/>
   </p:clrMapOvr>
+  <p:timing>
+    <p:tnLst>
+      <p:par>
+        <p:cTn id="1" dur="indefinite" restart="never" nodeType="tmRoot"/>
+      </p:par>
+    </p:tnLst>
+  </p:timing>
 </p:sld>
 </file>
 
@@ -4973,8 +5681,35 @@
           <a:lstStyle/>
           <a:p>
             <a:r>
-              <a:rPr lang="pt-BR" dirty="0" err="1" smtClean="0"/>
-              <a:t>Features</a:t>
+              <a:rPr lang="pt-BR" dirty="0" smtClean="0"/>
+              <a:t>Project </a:t>
+            </a:r>
+            <a:r>
+              <a:rPr lang="pt-BR" dirty="0" err="1" smtClean="0"/>
+              <a:t>tracking</a:t>
+            </a:r>
+            <a:endParaRPr lang="pt-BR" dirty="0"/>
+          </a:p>
+        </p:txBody>
+      </p:sp>
+      <p:sp>
+        <p:nvSpPr>
+          <p:cNvPr id="3" name="Espaço Reservado para Conteúdo 2"/>
+          <p:cNvSpPr>
+            <a:spLocks noGrp="1"/>
+          </p:cNvSpPr>
+          <p:nvPr>
+            <p:ph idx="1"/>
+          </p:nvPr>
+        </p:nvSpPr>
+        <p:spPr/>
+        <p:txBody>
+          <a:bodyPr/>
+          <a:lstStyle/>
+          <a:p>
+            <a:r>
+              <a:rPr lang="pt-BR" dirty="0" err="1" smtClean="0"/>
+              <a:t>Work</a:t>
             </a:r>
             <a:r>
               <a:rPr lang="pt-BR" dirty="0" smtClean="0"/>
@@ -4982,7 +5717,7 @@
             </a:r>
             <a:r>
               <a:rPr lang="pt-BR" dirty="0" err="1" smtClean="0"/>
-              <a:t>to</a:t>
+              <a:t>will</a:t>
             </a:r>
             <a:r>
               <a:rPr lang="pt-BR" dirty="0" smtClean="0"/>
@@ -4998,39 +5733,44 @@
             </a:r>
             <a:r>
               <a:rPr lang="pt-BR" dirty="0" err="1" smtClean="0"/>
-              <a:t>implemented</a:t>
-            </a:r>
-            <a:endParaRPr lang="pt-BR" dirty="0"/>
-          </a:p>
-        </p:txBody>
-      </p:sp>
-      <p:sp>
-        <p:nvSpPr>
-          <p:cNvPr id="3" name="Espaço Reservado para Conteúdo 2"/>
-          <p:cNvSpPr>
-            <a:spLocks noGrp="1"/>
-          </p:cNvSpPr>
-          <p:nvPr>
-            <p:ph idx="1"/>
-          </p:nvPr>
-        </p:nvSpPr>
-        <p:spPr/>
-        <p:txBody>
-          <a:bodyPr/>
-          <a:lstStyle/>
-          <a:p>
-            <a:r>
-              <a:rPr lang="pt-BR" dirty="0" smtClean="0"/>
-              <a:t>Go </a:t>
-            </a:r>
-            <a:r>
-              <a:rPr lang="pt-BR" dirty="0" err="1" smtClean="0"/>
-              <a:t>to</a:t>
-            </a:r>
-            <a:r>
-              <a:rPr lang="pt-BR" dirty="0" smtClean="0"/>
-              <a:t> ASANA</a:t>
-            </a:r>
+              <a:t>tracked</a:t>
+            </a:r>
+            <a:r>
+              <a:rPr lang="pt-BR" dirty="0" smtClean="0"/>
+              <a:t> </a:t>
+            </a:r>
+            <a:r>
+              <a:rPr lang="pt-BR" dirty="0" err="1" smtClean="0"/>
+              <a:t>using</a:t>
+            </a:r>
+            <a:r>
+              <a:rPr lang="pt-BR" dirty="0" smtClean="0"/>
+              <a:t> ASANA (</a:t>
+            </a:r>
+            <a:r>
+              <a:rPr lang="pt-BR" dirty="0" err="1" smtClean="0"/>
+              <a:t>or</a:t>
+            </a:r>
+            <a:r>
+              <a:rPr lang="pt-BR" dirty="0" smtClean="0"/>
+              <a:t> TRELLO??)</a:t>
+            </a:r>
+          </a:p>
+          <a:p>
+            <a:r>
+              <a:rPr lang="pt-BR" dirty="0" smtClean="0"/>
+              <a:t>SCRUM-</a:t>
+            </a:r>
+            <a:r>
+              <a:rPr lang="pt-BR" dirty="0" err="1" smtClean="0"/>
+              <a:t>based</a:t>
+            </a:r>
+            <a:r>
+              <a:rPr lang="pt-BR" dirty="0" smtClean="0"/>
+              <a:t>?</a:t>
+            </a:r>
+          </a:p>
+          <a:p>
             <a:endParaRPr lang="pt-BR" dirty="0"/>
           </a:p>
         </p:txBody>
@@ -5038,13 +5778,20 @@
     </p:spTree>
     <p:extLst>
       <p:ext uri="{BB962C8B-B14F-4D97-AF65-F5344CB8AC3E}">
-        <p14:creationId xmlns:p14="http://schemas.microsoft.com/office/powerpoint/2010/main" val="3187348570"/>
+        <p14:creationId xmlns:p14="http://schemas.microsoft.com/office/powerpoint/2010/main" val="3698729868"/>
       </p:ext>
     </p:extLst>
   </p:cSld>
   <p:clrMapOvr>
     <a:masterClrMapping/>
   </p:clrMapOvr>
+  <p:timing>
+    <p:tnLst>
+      <p:par>
+        <p:cTn id="1" dur="indefinite" restart="never" nodeType="tmRoot"/>
+      </p:par>
+    </p:tnLst>
+  </p:timing>
 </p:sld>
 </file>
 
@@ -5081,8 +5828,32 @@
           <a:lstStyle/>
           <a:p>
             <a:r>
-              <a:rPr lang="pt-BR" dirty="0" smtClean="0"/>
-              <a:t>AOB</a:t>
+              <a:rPr lang="pt-BR" dirty="0" err="1" smtClean="0"/>
+              <a:t>Features</a:t>
+            </a:r>
+            <a:r>
+              <a:rPr lang="pt-BR" dirty="0" smtClean="0"/>
+              <a:t> </a:t>
+            </a:r>
+            <a:r>
+              <a:rPr lang="pt-BR" dirty="0" err="1" smtClean="0"/>
+              <a:t>to</a:t>
+            </a:r>
+            <a:r>
+              <a:rPr lang="pt-BR" dirty="0" smtClean="0"/>
+              <a:t> </a:t>
+            </a:r>
+            <a:r>
+              <a:rPr lang="pt-BR" dirty="0" err="1" smtClean="0"/>
+              <a:t>be</a:t>
+            </a:r>
+            <a:r>
+              <a:rPr lang="pt-BR" dirty="0" smtClean="0"/>
+              <a:t> </a:t>
+            </a:r>
+            <a:r>
+              <a:rPr lang="pt-BR" dirty="0" err="1" smtClean="0"/>
+              <a:t>implemented</a:t>
             </a:r>
             <a:endParaRPr lang="pt-BR" dirty="0"/>
           </a:p>
@@ -5104,12 +5875,8 @@
           <a:lstStyle/>
           <a:p>
             <a:r>
-              <a:rPr lang="pt-BR" dirty="0" err="1" smtClean="0"/>
-              <a:t>How</a:t>
-            </a:r>
-            <a:r>
-              <a:rPr lang="pt-BR" dirty="0" smtClean="0"/>
-              <a:t> </a:t>
+              <a:rPr lang="pt-BR" dirty="0" smtClean="0"/>
+              <a:t>Go </a:t>
             </a:r>
             <a:r>
               <a:rPr lang="pt-BR" dirty="0" err="1" smtClean="0"/>
@@ -5117,59 +5884,16 @@
             </a:r>
             <a:r>
               <a:rPr lang="pt-BR" dirty="0" smtClean="0"/>
-              <a:t> </a:t>
-            </a:r>
-            <a:r>
-              <a:rPr lang="pt-BR" dirty="0" err="1" smtClean="0"/>
-              <a:t>calculate</a:t>
-            </a:r>
-            <a:r>
-              <a:rPr lang="pt-BR" dirty="0" smtClean="0"/>
-              <a:t> performance </a:t>
-            </a:r>
-            <a:r>
-              <a:rPr lang="pt-BR" dirty="0" err="1" smtClean="0"/>
-              <a:t>degradation</a:t>
-            </a:r>
-            <a:r>
-              <a:rPr lang="pt-BR" dirty="0" smtClean="0"/>
-              <a:t> </a:t>
-            </a:r>
-            <a:r>
-              <a:rPr lang="pt-BR" dirty="0" err="1" smtClean="0"/>
-              <a:t>of</a:t>
-            </a:r>
-            <a:r>
-              <a:rPr lang="pt-BR" dirty="0" smtClean="0"/>
-              <a:t> IMT?</a:t>
-            </a:r>
-          </a:p>
-          <a:p>
-            <a:pPr lvl="1"/>
-            <a:r>
-              <a:rPr lang="pt-BR" dirty="0" err="1" smtClean="0"/>
-              <a:t>Check</a:t>
-            </a:r>
-            <a:r>
-              <a:rPr lang="pt-BR" dirty="0" smtClean="0"/>
-              <a:t> e-mail </a:t>
-            </a:r>
-            <a:r>
-              <a:rPr lang="pt-BR" dirty="0" err="1" smtClean="0"/>
-              <a:t>from</a:t>
-            </a:r>
-            <a:r>
-              <a:rPr lang="pt-BR" smtClean="0"/>
-              <a:t> Tarcisio</a:t>
-            </a:r>
-            <a:endParaRPr lang="pt-BR"/>
+              <a:t> ASANA</a:t>
+            </a:r>
+            <a:endParaRPr lang="pt-BR" dirty="0"/>
           </a:p>
         </p:txBody>
       </p:sp>
     </p:spTree>
     <p:extLst>
       <p:ext uri="{BB962C8B-B14F-4D97-AF65-F5344CB8AC3E}">
-        <p14:creationId xmlns:p14="http://schemas.microsoft.com/office/powerpoint/2010/main" val="3874876216"/>
+        <p14:creationId xmlns:p14="http://schemas.microsoft.com/office/powerpoint/2010/main" val="3187348570"/>
       </p:ext>
     </p:extLst>
   </p:cSld>

</xml_diff>